<commit_message>
Initial design spec for the scheduling system is done. Now to create the design.
</commit_message>
<xml_diff>
--- a/design/specifications/Project images.pptx
+++ b/design/specifications/Project images.pptx
@@ -7,6 +7,7 @@
   <p:sldIdLst>
     <p:sldId id="257" r:id="rId2"/>
     <p:sldId id="258" r:id="rId3"/>
+    <p:sldId id="259" r:id="rId4"/>
   </p:sldIdLst>
   <p:sldSz cx="9144000" cy="6858000" type="screen4x3"/>
   <p:notesSz cx="6858000" cy="9144000"/>
@@ -290,7 +291,7 @@
             <a:fld id="{74CD4D2F-3F67-4186-ADEA-E0E7C9CEFA34}" type="datetimeFigureOut">
               <a:rPr lang="en-NZ" smtClean="0"/>
               <a:pPr/>
-              <a:t>22/08/2010</a:t>
+              <a:t>19/10/2011</a:t>
             </a:fld>
             <a:endParaRPr lang="en-NZ"/>
           </a:p>
@@ -457,7 +458,7 @@
             <a:fld id="{74CD4D2F-3F67-4186-ADEA-E0E7C9CEFA34}" type="datetimeFigureOut">
               <a:rPr lang="en-NZ" smtClean="0"/>
               <a:pPr/>
-              <a:t>22/08/2010</a:t>
+              <a:t>19/10/2011</a:t>
             </a:fld>
             <a:endParaRPr lang="en-NZ"/>
           </a:p>
@@ -634,7 +635,7 @@
             <a:fld id="{74CD4D2F-3F67-4186-ADEA-E0E7C9CEFA34}" type="datetimeFigureOut">
               <a:rPr lang="en-NZ" smtClean="0"/>
               <a:pPr/>
-              <a:t>22/08/2010</a:t>
+              <a:t>19/10/2011</a:t>
             </a:fld>
             <a:endParaRPr lang="en-NZ"/>
           </a:p>
@@ -801,7 +802,7 @@
             <a:fld id="{74CD4D2F-3F67-4186-ADEA-E0E7C9CEFA34}" type="datetimeFigureOut">
               <a:rPr lang="en-NZ" smtClean="0"/>
               <a:pPr/>
-              <a:t>22/08/2010</a:t>
+              <a:t>19/10/2011</a:t>
             </a:fld>
             <a:endParaRPr lang="en-NZ"/>
           </a:p>
@@ -1044,7 +1045,7 @@
             <a:fld id="{74CD4D2F-3F67-4186-ADEA-E0E7C9CEFA34}" type="datetimeFigureOut">
               <a:rPr lang="en-NZ" smtClean="0"/>
               <a:pPr/>
-              <a:t>22/08/2010</a:t>
+              <a:t>19/10/2011</a:t>
             </a:fld>
             <a:endParaRPr lang="en-NZ"/>
           </a:p>
@@ -1329,7 +1330,7 @@
             <a:fld id="{74CD4D2F-3F67-4186-ADEA-E0E7C9CEFA34}" type="datetimeFigureOut">
               <a:rPr lang="en-NZ" smtClean="0"/>
               <a:pPr/>
-              <a:t>22/08/2010</a:t>
+              <a:t>19/10/2011</a:t>
             </a:fld>
             <a:endParaRPr lang="en-NZ"/>
           </a:p>
@@ -1748,7 +1749,7 @@
             <a:fld id="{74CD4D2F-3F67-4186-ADEA-E0E7C9CEFA34}" type="datetimeFigureOut">
               <a:rPr lang="en-NZ" smtClean="0"/>
               <a:pPr/>
-              <a:t>22/08/2010</a:t>
+              <a:t>19/10/2011</a:t>
             </a:fld>
             <a:endParaRPr lang="en-NZ"/>
           </a:p>
@@ -1863,7 +1864,7 @@
             <a:fld id="{74CD4D2F-3F67-4186-ADEA-E0E7C9CEFA34}" type="datetimeFigureOut">
               <a:rPr lang="en-NZ" smtClean="0"/>
               <a:pPr/>
-              <a:t>22/08/2010</a:t>
+              <a:t>19/10/2011</a:t>
             </a:fld>
             <a:endParaRPr lang="en-NZ"/>
           </a:p>
@@ -1955,7 +1956,7 @@
             <a:fld id="{74CD4D2F-3F67-4186-ADEA-E0E7C9CEFA34}" type="datetimeFigureOut">
               <a:rPr lang="en-NZ" smtClean="0"/>
               <a:pPr/>
-              <a:t>22/08/2010</a:t>
+              <a:t>19/10/2011</a:t>
             </a:fld>
             <a:endParaRPr lang="en-NZ"/>
           </a:p>
@@ -2229,7 +2230,7 @@
             <a:fld id="{74CD4D2F-3F67-4186-ADEA-E0E7C9CEFA34}" type="datetimeFigureOut">
               <a:rPr lang="en-NZ" smtClean="0"/>
               <a:pPr/>
-              <a:t>22/08/2010</a:t>
+              <a:t>19/10/2011</a:t>
             </a:fld>
             <a:endParaRPr lang="en-NZ"/>
           </a:p>
@@ -2479,7 +2480,7 @@
             <a:fld id="{74CD4D2F-3F67-4186-ADEA-E0E7C9CEFA34}" type="datetimeFigureOut">
               <a:rPr lang="en-NZ" smtClean="0"/>
               <a:pPr/>
-              <a:t>22/08/2010</a:t>
+              <a:t>19/10/2011</a:t>
             </a:fld>
             <a:endParaRPr lang="en-NZ"/>
           </a:p>
@@ -2689,7 +2690,7 @@
             <a:fld id="{74CD4D2F-3F67-4186-ADEA-E0E7C9CEFA34}" type="datetimeFigureOut">
               <a:rPr lang="en-NZ" smtClean="0"/>
               <a:pPr/>
-              <a:t>22/08/2010</a:t>
+              <a:t>19/10/2011</a:t>
             </a:fld>
             <a:endParaRPr lang="en-NZ"/>
           </a:p>
@@ -3826,20 +3827,7 @@
                   <a:schemeClr val="tx1"/>
                 </a:solidFill>
               </a:rPr>
-              <a:t>Dataset </a:t>
-            </a:r>
-            <a:r>
-              <a:rPr lang="en-NZ" dirty="0" smtClean="0">
-                <a:ln>
-                  <a:solidFill>
-                    <a:schemeClr val="tx1"/>
-                  </a:solidFill>
-                </a:ln>
-                <a:solidFill>
-                  <a:schemeClr val="tx1"/>
-                </a:solidFill>
-              </a:rPr>
-              <a:t>2</a:t>
+              <a:t>Dataset 2</a:t>
             </a:r>
             <a:endParaRPr lang="en-NZ" dirty="0">
               <a:ln>
@@ -4007,20 +3995,7 @@
                   <a:schemeClr val="tx1"/>
                 </a:solidFill>
               </a:rPr>
-              <a:t>Dataset </a:t>
-            </a:r>
-            <a:r>
-              <a:rPr lang="en-NZ" dirty="0" smtClean="0">
-                <a:ln>
-                  <a:solidFill>
-                    <a:schemeClr val="tx1"/>
-                  </a:solidFill>
-                </a:ln>
-                <a:solidFill>
-                  <a:schemeClr val="tx1"/>
-                </a:solidFill>
-              </a:rPr>
-              <a:t>4</a:t>
+              <a:t>Dataset 4</a:t>
             </a:r>
             <a:endParaRPr lang="en-NZ" dirty="0">
               <a:ln>
@@ -5023,6 +4998,655 @@
               </a:rPr>
               <a:t>named pipes</a:t>
             </a:r>
+          </a:p>
+        </p:txBody>
+      </p:sp>
+    </p:spTree>
+  </p:cSld>
+  <p:clrMapOvr>
+    <a:masterClrMapping/>
+  </p:clrMapOvr>
+</p:sld>
+</file>
+
+<file path=ppt/slides/slide3.xml><?xml version="1.0" encoding="utf-8"?>
+<p:sld xmlns:a="http://schemas.openxmlformats.org/drawingml/2006/main" xmlns:r="http://schemas.openxmlformats.org/officeDocument/2006/relationships" xmlns:p="http://schemas.openxmlformats.org/presentationml/2006/main">
+  <p:cSld>
+    <p:spTree>
+      <p:nvGrpSpPr>
+        <p:cNvPr id="1" name=""/>
+        <p:cNvGrpSpPr/>
+        <p:nvPr/>
+      </p:nvGrpSpPr>
+      <p:grpSpPr>
+        <a:xfrm>
+          <a:off x="0" y="0"/>
+          <a:ext cx="0" cy="0"/>
+          <a:chOff x="0" y="0"/>
+          <a:chExt cx="0" cy="0"/>
+        </a:xfrm>
+      </p:grpSpPr>
+      <p:sp>
+        <p:nvSpPr>
+          <p:cNvPr id="2" name="Oval 1"/>
+          <p:cNvSpPr/>
+          <p:nvPr/>
+        </p:nvSpPr>
+        <p:spPr>
+          <a:xfrm>
+            <a:off x="539552" y="404664"/>
+            <a:ext cx="1080120" cy="1080120"/>
+          </a:xfrm>
+          <a:prstGeom prst="ellipse">
+            <a:avLst/>
+          </a:prstGeom>
+          <a:noFill/>
+          <a:ln>
+            <a:solidFill>
+              <a:schemeClr val="tx1"/>
+            </a:solidFill>
+          </a:ln>
+        </p:spPr>
+        <p:style>
+          <a:lnRef idx="2">
+            <a:schemeClr val="accent1">
+              <a:shade val="50000"/>
+            </a:schemeClr>
+          </a:lnRef>
+          <a:fillRef idx="1">
+            <a:schemeClr val="accent1"/>
+          </a:fillRef>
+          <a:effectRef idx="0">
+            <a:schemeClr val="accent1"/>
+          </a:effectRef>
+          <a:fontRef idx="minor">
+            <a:schemeClr val="lt1"/>
+          </a:fontRef>
+        </p:style>
+        <p:txBody>
+          <a:bodyPr rtlCol="0" anchor="ctr"/>
+          <a:lstStyle/>
+          <a:p>
+            <a:pPr algn="ctr"/>
+            <a:r>
+              <a:rPr lang="en-NZ" b="1" dirty="0" smtClean="0">
+                <a:solidFill>
+                  <a:schemeClr val="tx1"/>
+                </a:solidFill>
+              </a:rPr>
+              <a:t>Start</a:t>
+            </a:r>
+            <a:endParaRPr lang="en-NZ" b="1" dirty="0">
+              <a:solidFill>
+                <a:schemeClr val="tx1"/>
+              </a:solidFill>
+            </a:endParaRPr>
+          </a:p>
+        </p:txBody>
+      </p:sp>
+      <p:sp>
+        <p:nvSpPr>
+          <p:cNvPr id="3" name="Oval 2"/>
+          <p:cNvSpPr/>
+          <p:nvPr/>
+        </p:nvSpPr>
+        <p:spPr>
+          <a:xfrm>
+            <a:off x="7000892" y="2143116"/>
+            <a:ext cx="1080120" cy="1080120"/>
+          </a:xfrm>
+          <a:prstGeom prst="ellipse">
+            <a:avLst/>
+          </a:prstGeom>
+          <a:noFill/>
+          <a:ln>
+            <a:solidFill>
+              <a:schemeClr val="tx1"/>
+            </a:solidFill>
+          </a:ln>
+        </p:spPr>
+        <p:style>
+          <a:lnRef idx="2">
+            <a:schemeClr val="accent1">
+              <a:shade val="50000"/>
+            </a:schemeClr>
+          </a:lnRef>
+          <a:fillRef idx="1">
+            <a:schemeClr val="accent1"/>
+          </a:fillRef>
+          <a:effectRef idx="0">
+            <a:schemeClr val="accent1"/>
+          </a:effectRef>
+          <a:fontRef idx="minor">
+            <a:schemeClr val="lt1"/>
+          </a:fontRef>
+        </p:style>
+        <p:txBody>
+          <a:bodyPr rtlCol="0" anchor="ctr"/>
+          <a:lstStyle/>
+          <a:p>
+            <a:pPr algn="ctr"/>
+            <a:r>
+              <a:rPr lang="en-NZ" sz="1200" b="1" dirty="0" smtClean="0">
+                <a:solidFill>
+                  <a:schemeClr val="tx1"/>
+                </a:solidFill>
+              </a:rPr>
+              <a:t>Calculate variable 3</a:t>
+            </a:r>
+            <a:endParaRPr lang="en-NZ" sz="1200" b="1" dirty="0">
+              <a:solidFill>
+                <a:schemeClr val="tx1"/>
+              </a:solidFill>
+            </a:endParaRPr>
+          </a:p>
+        </p:txBody>
+      </p:sp>
+      <p:sp>
+        <p:nvSpPr>
+          <p:cNvPr id="4" name="Oval 3"/>
+          <p:cNvSpPr/>
+          <p:nvPr/>
+        </p:nvSpPr>
+        <p:spPr>
+          <a:xfrm>
+            <a:off x="3929058" y="2214554"/>
+            <a:ext cx="1080120" cy="1080120"/>
+          </a:xfrm>
+          <a:prstGeom prst="ellipse">
+            <a:avLst/>
+          </a:prstGeom>
+          <a:noFill/>
+          <a:ln>
+            <a:solidFill>
+              <a:schemeClr val="tx1"/>
+            </a:solidFill>
+          </a:ln>
+        </p:spPr>
+        <p:style>
+          <a:lnRef idx="2">
+            <a:schemeClr val="accent1">
+              <a:shade val="50000"/>
+            </a:schemeClr>
+          </a:lnRef>
+          <a:fillRef idx="1">
+            <a:schemeClr val="accent1"/>
+          </a:fillRef>
+          <a:effectRef idx="0">
+            <a:schemeClr val="accent1"/>
+          </a:effectRef>
+          <a:fontRef idx="minor">
+            <a:schemeClr val="lt1"/>
+          </a:fontRef>
+        </p:style>
+        <p:txBody>
+          <a:bodyPr rtlCol="0" anchor="ctr"/>
+          <a:lstStyle/>
+          <a:p>
+            <a:pPr algn="ctr"/>
+            <a:r>
+              <a:rPr lang="en-NZ" sz="1200" b="1" dirty="0" smtClean="0">
+                <a:solidFill>
+                  <a:schemeClr val="tx1"/>
+                </a:solidFill>
+              </a:rPr>
+              <a:t>Calculate variable 1</a:t>
+            </a:r>
+            <a:endParaRPr lang="en-NZ" sz="1200" b="1" dirty="0">
+              <a:solidFill>
+                <a:schemeClr val="tx1"/>
+              </a:solidFill>
+            </a:endParaRPr>
+          </a:p>
+        </p:txBody>
+      </p:sp>
+      <p:sp>
+        <p:nvSpPr>
+          <p:cNvPr id="5" name="Oval 4"/>
+          <p:cNvSpPr/>
+          <p:nvPr/>
+        </p:nvSpPr>
+        <p:spPr>
+          <a:xfrm>
+            <a:off x="5572132" y="357166"/>
+            <a:ext cx="1080120" cy="1080120"/>
+          </a:xfrm>
+          <a:prstGeom prst="ellipse">
+            <a:avLst/>
+          </a:prstGeom>
+          <a:noFill/>
+          <a:ln>
+            <a:solidFill>
+              <a:schemeClr val="tx1"/>
+            </a:solidFill>
+          </a:ln>
+        </p:spPr>
+        <p:style>
+          <a:lnRef idx="2">
+            <a:schemeClr val="accent1">
+              <a:shade val="50000"/>
+            </a:schemeClr>
+          </a:lnRef>
+          <a:fillRef idx="1">
+            <a:schemeClr val="accent1"/>
+          </a:fillRef>
+          <a:effectRef idx="0">
+            <a:schemeClr val="accent1"/>
+          </a:effectRef>
+          <a:fontRef idx="minor">
+            <a:schemeClr val="lt1"/>
+          </a:fontRef>
+        </p:style>
+        <p:txBody>
+          <a:bodyPr rtlCol="0" anchor="ctr"/>
+          <a:lstStyle/>
+          <a:p>
+            <a:pPr algn="ctr"/>
+            <a:r>
+              <a:rPr lang="en-NZ" sz="1200" b="1" dirty="0" smtClean="0">
+                <a:solidFill>
+                  <a:schemeClr val="tx1"/>
+                </a:solidFill>
+              </a:rPr>
+              <a:t>Calculate variable 2</a:t>
+            </a:r>
+            <a:endParaRPr lang="en-NZ" sz="1200" b="1" dirty="0">
+              <a:solidFill>
+                <a:schemeClr val="tx1"/>
+              </a:solidFill>
+            </a:endParaRPr>
+          </a:p>
+        </p:txBody>
+      </p:sp>
+      <p:sp>
+        <p:nvSpPr>
+          <p:cNvPr id="6" name="Oval 5"/>
+          <p:cNvSpPr/>
+          <p:nvPr/>
+        </p:nvSpPr>
+        <p:spPr>
+          <a:xfrm>
+            <a:off x="2428860" y="4857760"/>
+            <a:ext cx="1080120" cy="1080120"/>
+          </a:xfrm>
+          <a:prstGeom prst="ellipse">
+            <a:avLst/>
+          </a:prstGeom>
+          <a:noFill/>
+          <a:ln>
+            <a:solidFill>
+              <a:schemeClr val="tx1"/>
+            </a:solidFill>
+          </a:ln>
+        </p:spPr>
+        <p:style>
+          <a:lnRef idx="2">
+            <a:schemeClr val="accent1">
+              <a:shade val="50000"/>
+            </a:schemeClr>
+          </a:lnRef>
+          <a:fillRef idx="1">
+            <a:schemeClr val="accent1"/>
+          </a:fillRef>
+          <a:effectRef idx="0">
+            <a:schemeClr val="accent1"/>
+          </a:effectRef>
+          <a:fontRef idx="minor">
+            <a:schemeClr val="lt1"/>
+          </a:fontRef>
+        </p:style>
+        <p:txBody>
+          <a:bodyPr rtlCol="0" anchor="ctr"/>
+          <a:lstStyle/>
+          <a:p>
+            <a:pPr algn="ctr"/>
+            <a:r>
+              <a:rPr lang="en-NZ" b="1" dirty="0" smtClean="0">
+                <a:solidFill>
+                  <a:schemeClr val="tx1"/>
+                </a:solidFill>
+              </a:rPr>
+              <a:t>End</a:t>
+            </a:r>
+            <a:endParaRPr lang="en-NZ" b="1" dirty="0">
+              <a:solidFill>
+                <a:schemeClr val="tx1"/>
+              </a:solidFill>
+            </a:endParaRPr>
+          </a:p>
+        </p:txBody>
+      </p:sp>
+      <p:sp>
+        <p:nvSpPr>
+          <p:cNvPr id="7" name="Right Arrow 6"/>
+          <p:cNvSpPr/>
+          <p:nvPr/>
+        </p:nvSpPr>
+        <p:spPr>
+          <a:xfrm rot="4115672">
+            <a:off x="933022" y="1963177"/>
+            <a:ext cx="1224136" cy="288032"/>
+          </a:xfrm>
+          <a:prstGeom prst="rightArrow">
+            <a:avLst/>
+          </a:prstGeom>
+          <a:noFill/>
+          <a:ln>
+            <a:solidFill>
+              <a:schemeClr val="tx1"/>
+            </a:solidFill>
+          </a:ln>
+        </p:spPr>
+        <p:style>
+          <a:lnRef idx="2">
+            <a:schemeClr val="accent1">
+              <a:shade val="50000"/>
+            </a:schemeClr>
+          </a:lnRef>
+          <a:fillRef idx="1">
+            <a:schemeClr val="accent1"/>
+          </a:fillRef>
+          <a:effectRef idx="0">
+            <a:schemeClr val="accent1"/>
+          </a:effectRef>
+          <a:fontRef idx="minor">
+            <a:schemeClr val="lt1"/>
+          </a:fontRef>
+        </p:style>
+        <p:txBody>
+          <a:bodyPr rtlCol="0" anchor="ctr"/>
+          <a:lstStyle/>
+          <a:p>
+            <a:pPr algn="ctr"/>
+            <a:endParaRPr lang="en-NZ"/>
+          </a:p>
+        </p:txBody>
+      </p:sp>
+      <p:sp>
+        <p:nvSpPr>
+          <p:cNvPr id="8" name="Right Arrow 7"/>
+          <p:cNvSpPr/>
+          <p:nvPr/>
+        </p:nvSpPr>
+        <p:spPr>
+          <a:xfrm rot="19062654">
+            <a:off x="4584647" y="1502421"/>
+            <a:ext cx="1167980" cy="257562"/>
+          </a:xfrm>
+          <a:prstGeom prst="rightArrow">
+            <a:avLst/>
+          </a:prstGeom>
+          <a:noFill/>
+          <a:ln>
+            <a:solidFill>
+              <a:schemeClr val="tx1"/>
+            </a:solidFill>
+          </a:ln>
+        </p:spPr>
+        <p:style>
+          <a:lnRef idx="2">
+            <a:schemeClr val="accent1">
+              <a:shade val="50000"/>
+            </a:schemeClr>
+          </a:lnRef>
+          <a:fillRef idx="1">
+            <a:schemeClr val="accent1"/>
+          </a:fillRef>
+          <a:effectRef idx="0">
+            <a:schemeClr val="accent1"/>
+          </a:effectRef>
+          <a:fontRef idx="minor">
+            <a:schemeClr val="lt1"/>
+          </a:fontRef>
+        </p:style>
+        <p:txBody>
+          <a:bodyPr rtlCol="0" anchor="ctr"/>
+          <a:lstStyle/>
+          <a:p>
+            <a:pPr algn="ctr"/>
+            <a:endParaRPr lang="en-NZ"/>
+          </a:p>
+        </p:txBody>
+      </p:sp>
+      <p:sp>
+        <p:nvSpPr>
+          <p:cNvPr id="9" name="Right Arrow 8"/>
+          <p:cNvSpPr/>
+          <p:nvPr/>
+        </p:nvSpPr>
+        <p:spPr>
+          <a:xfrm rot="10800000">
+            <a:off x="5143504" y="2643182"/>
+            <a:ext cx="1785950" cy="280286"/>
+          </a:xfrm>
+          <a:prstGeom prst="rightArrow">
+            <a:avLst/>
+          </a:prstGeom>
+          <a:noFill/>
+          <a:ln>
+            <a:solidFill>
+              <a:schemeClr val="tx1"/>
+            </a:solidFill>
+          </a:ln>
+        </p:spPr>
+        <p:style>
+          <a:lnRef idx="2">
+            <a:schemeClr val="accent1">
+              <a:shade val="50000"/>
+            </a:schemeClr>
+          </a:lnRef>
+          <a:fillRef idx="1">
+            <a:schemeClr val="accent1"/>
+          </a:fillRef>
+          <a:effectRef idx="0">
+            <a:schemeClr val="accent1"/>
+          </a:effectRef>
+          <a:fontRef idx="minor">
+            <a:schemeClr val="lt1"/>
+          </a:fontRef>
+        </p:style>
+        <p:txBody>
+          <a:bodyPr rtlCol="0" anchor="ctr"/>
+          <a:lstStyle/>
+          <a:p>
+            <a:pPr algn="ctr"/>
+            <a:endParaRPr lang="en-NZ"/>
+          </a:p>
+        </p:txBody>
+      </p:sp>
+      <p:sp>
+        <p:nvSpPr>
+          <p:cNvPr id="10" name="Right Arrow 9"/>
+          <p:cNvSpPr/>
+          <p:nvPr/>
+        </p:nvSpPr>
+        <p:spPr>
+          <a:xfrm rot="4115672">
+            <a:off x="2043793" y="4204193"/>
+            <a:ext cx="924320" cy="263656"/>
+          </a:xfrm>
+          <a:prstGeom prst="rightArrow">
+            <a:avLst/>
+          </a:prstGeom>
+          <a:noFill/>
+          <a:ln>
+            <a:solidFill>
+              <a:schemeClr val="tx1"/>
+            </a:solidFill>
+          </a:ln>
+        </p:spPr>
+        <p:style>
+          <a:lnRef idx="2">
+            <a:schemeClr val="accent1">
+              <a:shade val="50000"/>
+            </a:schemeClr>
+          </a:lnRef>
+          <a:fillRef idx="1">
+            <a:schemeClr val="accent1"/>
+          </a:fillRef>
+          <a:effectRef idx="0">
+            <a:schemeClr val="accent1"/>
+          </a:effectRef>
+          <a:fontRef idx="minor">
+            <a:schemeClr val="lt1"/>
+          </a:fontRef>
+        </p:style>
+        <p:txBody>
+          <a:bodyPr rtlCol="0" anchor="ctr"/>
+          <a:lstStyle/>
+          <a:p>
+            <a:pPr algn="ctr"/>
+            <a:endParaRPr lang="en-NZ"/>
+          </a:p>
+        </p:txBody>
+      </p:sp>
+      <p:sp>
+        <p:nvSpPr>
+          <p:cNvPr id="11" name="Right Arrow 10"/>
+          <p:cNvSpPr/>
+          <p:nvPr/>
+        </p:nvSpPr>
+        <p:spPr>
+          <a:xfrm rot="2871453">
+            <a:off x="6444120" y="1586469"/>
+            <a:ext cx="925127" cy="257562"/>
+          </a:xfrm>
+          <a:prstGeom prst="rightArrow">
+            <a:avLst/>
+          </a:prstGeom>
+          <a:noFill/>
+          <a:ln>
+            <a:solidFill>
+              <a:schemeClr val="tx1"/>
+            </a:solidFill>
+          </a:ln>
+        </p:spPr>
+        <p:style>
+          <a:lnRef idx="2">
+            <a:schemeClr val="accent1">
+              <a:shade val="50000"/>
+            </a:schemeClr>
+          </a:lnRef>
+          <a:fillRef idx="1">
+            <a:schemeClr val="accent1"/>
+          </a:fillRef>
+          <a:effectRef idx="0">
+            <a:schemeClr val="accent1"/>
+          </a:effectRef>
+          <a:fontRef idx="minor">
+            <a:schemeClr val="lt1"/>
+          </a:fontRef>
+        </p:style>
+        <p:txBody>
+          <a:bodyPr rtlCol="0" anchor="ctr"/>
+          <a:lstStyle/>
+          <a:p>
+            <a:pPr algn="ctr"/>
+            <a:endParaRPr lang="en-NZ"/>
+          </a:p>
+        </p:txBody>
+      </p:sp>
+      <p:sp>
+        <p:nvSpPr>
+          <p:cNvPr id="12" name="Oval 11"/>
+          <p:cNvSpPr/>
+          <p:nvPr/>
+        </p:nvSpPr>
+        <p:spPr>
+          <a:xfrm>
+            <a:off x="1500166" y="2714620"/>
+            <a:ext cx="1080120" cy="1080120"/>
+          </a:xfrm>
+          <a:prstGeom prst="ellipse">
+            <a:avLst/>
+          </a:prstGeom>
+          <a:noFill/>
+          <a:ln>
+            <a:solidFill>
+              <a:schemeClr val="tx1"/>
+            </a:solidFill>
+          </a:ln>
+        </p:spPr>
+        <p:style>
+          <a:lnRef idx="2">
+            <a:schemeClr val="accent1">
+              <a:shade val="50000"/>
+            </a:schemeClr>
+          </a:lnRef>
+          <a:fillRef idx="1">
+            <a:schemeClr val="accent1"/>
+          </a:fillRef>
+          <a:effectRef idx="0">
+            <a:schemeClr val="accent1"/>
+          </a:effectRef>
+          <a:fontRef idx="minor">
+            <a:schemeClr val="lt1"/>
+          </a:fontRef>
+        </p:style>
+        <p:txBody>
+          <a:bodyPr rtlCol="0" anchor="ctr"/>
+          <a:lstStyle/>
+          <a:p>
+            <a:pPr algn="ctr"/>
+            <a:r>
+              <a:rPr lang="en-NZ" b="1" dirty="0" smtClean="0">
+                <a:solidFill>
+                  <a:schemeClr val="tx1"/>
+                </a:solidFill>
+              </a:rPr>
+              <a:t>Sub-step</a:t>
+            </a:r>
+            <a:endParaRPr lang="en-NZ" b="1" dirty="0">
+              <a:solidFill>
+                <a:schemeClr val="tx1"/>
+              </a:solidFill>
+            </a:endParaRPr>
+          </a:p>
+        </p:txBody>
+      </p:sp>
+      <p:sp>
+        <p:nvSpPr>
+          <p:cNvPr id="13" name="Right Arrow 12"/>
+          <p:cNvSpPr/>
+          <p:nvPr/>
+        </p:nvSpPr>
+        <p:spPr>
+          <a:xfrm rot="20849198">
+            <a:off x="2657204" y="2766655"/>
+            <a:ext cx="1167980" cy="257562"/>
+          </a:xfrm>
+          <a:prstGeom prst="rightArrow">
+            <a:avLst/>
+          </a:prstGeom>
+          <a:noFill/>
+          <a:ln>
+            <a:solidFill>
+              <a:schemeClr val="tx1"/>
+            </a:solidFill>
+          </a:ln>
+        </p:spPr>
+        <p:style>
+          <a:lnRef idx="2">
+            <a:schemeClr val="accent1">
+              <a:shade val="50000"/>
+            </a:schemeClr>
+          </a:lnRef>
+          <a:fillRef idx="1">
+            <a:schemeClr val="accent1"/>
+          </a:fillRef>
+          <a:effectRef idx="0">
+            <a:schemeClr val="accent1"/>
+          </a:effectRef>
+          <a:fontRef idx="minor">
+            <a:schemeClr val="lt1"/>
+          </a:fontRef>
+        </p:style>
+        <p:txBody>
+          <a:bodyPr rtlCol="0" anchor="ctr"/>
+          <a:lstStyle/>
+          <a:p>
+            <a:pPr algn="ctr"/>
+            <a:endParaRPr lang="en-NZ"/>
           </a:p>
         </p:txBody>
       </p:sp>

</xml_diff>